<commit_message>
Last and Final Changes
</commit_message>
<xml_diff>
--- a/Documents/Презентація/Презентація_Терешкович_ІТ-02_Захист.pptx
+++ b/Documents/Презентація/Презентація_Терешкович_ІТ-02_Захист.pptx
@@ -20,7 +20,7 @@
     <p:sldId id="268" r:id="rId11"/>
     <p:sldId id="262" r:id="rId12"/>
     <p:sldId id="279" r:id="rId13"/>
-    <p:sldId id="264" r:id="rId14"/>
+    <p:sldId id="281" r:id="rId14"/>
     <p:sldId id="267" r:id="rId15"/>
     <p:sldId id="273" r:id="rId16"/>
     <p:sldId id="280" r:id="rId17"/>
@@ -979,128 +979,6 @@
 </p:notes>
 </file>
 
-<file path=ppt/notesSlides/notesSlide10.xml><?xml version="1.0" encoding="utf-8"?>
-<p:notes xmlns:a="http://schemas.openxmlformats.org/drawingml/2006/main" xmlns:r="http://schemas.openxmlformats.org/officeDocument/2006/relationships" xmlns:p="http://schemas.openxmlformats.org/presentationml/2006/main" showMasterSp="0" showMasterPhAnim="0">
-  <p:cSld>
-    <p:spTree>
-      <p:nvGrpSpPr>
-        <p:cNvPr id="1" name="Shape 173"/>
-        <p:cNvGrpSpPr/>
-        <p:nvPr/>
-      </p:nvGrpSpPr>
-      <p:grpSpPr>
-        <a:xfrm>
-          <a:off x="0" y="0"/>
-          <a:ext cx="0" cy="0"/>
-          <a:chOff x="0" y="0"/>
-          <a:chExt cx="0" cy="0"/>
-        </a:xfrm>
-      </p:grpSpPr>
-      <p:sp>
-        <p:nvSpPr>
-          <p:cNvPr id="174" name="Google Shape;174;p12:notes"/>
-          <p:cNvSpPr txBox="1">
-            <a:spLocks noGrp="1"/>
-          </p:cNvSpPr>
-          <p:nvPr>
-            <p:ph type="body" idx="1"/>
-          </p:nvPr>
-        </p:nvSpPr>
-        <p:spPr>
-          <a:xfrm>
-            <a:off x="685800" y="4343400"/>
-            <a:ext cx="5486400" cy="4114800"/>
-          </a:xfrm>
-          <a:prstGeom prst="rect">
-            <a:avLst/>
-          </a:prstGeom>
-          <a:noFill/>
-          <a:ln>
-            <a:noFill/>
-          </a:ln>
-        </p:spPr>
-        <p:txBody>
-          <a:bodyPr spcFirstLastPara="1" wrap="square" lIns="91425" tIns="91425" rIns="91425" bIns="91425" anchor="t" anchorCtr="0">
-            <a:noAutofit/>
-          </a:bodyPr>
-          <a:lstStyle/>
-          <a:p>
-            <a:pPr marL="0" lvl="0" indent="0" algn="l" rtl="0">
-              <a:lnSpc>
-                <a:spcPct val="100000"/>
-              </a:lnSpc>
-              <a:spcBef>
-                <a:spcPts val="0"/>
-              </a:spcBef>
-              <a:spcAft>
-                <a:spcPts val="0"/>
-              </a:spcAft>
-              <a:buSzPts val="1100"/>
-              <a:buNone/>
-            </a:pPr>
-            <a:endParaRPr/>
-          </a:p>
-        </p:txBody>
-      </p:sp>
-      <p:sp>
-        <p:nvSpPr>
-          <p:cNvPr id="175" name="Google Shape;175;p12:notes"/>
-          <p:cNvSpPr>
-            <a:spLocks noGrp="1" noRot="1" noChangeAspect="1"/>
-          </p:cNvSpPr>
-          <p:nvPr>
-            <p:ph type="sldImg" idx="2"/>
-          </p:nvPr>
-        </p:nvSpPr>
-        <p:spPr>
-          <a:xfrm>
-            <a:off x="381000" y="685800"/>
-            <a:ext cx="6096000" cy="3429000"/>
-          </a:xfrm>
-          <a:custGeom>
-            <a:avLst/>
-            <a:gdLst/>
-            <a:ahLst/>
-            <a:cxnLst/>
-            <a:rect l="l" t="t" r="r" b="b"/>
-            <a:pathLst>
-              <a:path w="120000" h="120000" extrusionOk="0">
-                <a:moveTo>
-                  <a:pt x="0" y="0"/>
-                </a:moveTo>
-                <a:lnTo>
-                  <a:pt x="120000" y="0"/>
-                </a:lnTo>
-                <a:lnTo>
-                  <a:pt x="120000" y="120000"/>
-                </a:lnTo>
-                <a:lnTo>
-                  <a:pt x="0" y="120000"/>
-                </a:lnTo>
-                <a:close/>
-              </a:path>
-            </a:pathLst>
-          </a:custGeom>
-          <a:noFill/>
-          <a:ln w="9525" cap="flat" cmpd="sng">
-            <a:solidFill>
-              <a:srgbClr val="000000"/>
-            </a:solidFill>
-            <a:prstDash val="solid"/>
-            <a:round/>
-            <a:headEnd type="none" w="sm" len="sm"/>
-            <a:tailEnd type="none" w="sm" len="sm"/>
-          </a:ln>
-        </p:spPr>
-      </p:sp>
-    </p:spTree>
-  </p:cSld>
-  <p:clrMapOvr>
-    <a:masterClrMapping/>
-  </p:clrMapOvr>
-</p:notes>
-</file>
-
 <file path=ppt/notesSlides/notesSlide2.xml><?xml version="1.0" encoding="utf-8"?>
 <p:notes xmlns:a="http://schemas.openxmlformats.org/drawingml/2006/main" xmlns:r="http://schemas.openxmlformats.org/officeDocument/2006/relationships" xmlns:p="http://schemas.openxmlformats.org/presentationml/2006/main" showMasterSp="0" showMasterPhAnim="0">
   <p:cSld>
@@ -1904,7 +1782,7 @@
   <p:cSld>
     <p:spTree>
       <p:nvGrpSpPr>
-        <p:cNvPr id="1" name="Shape 151"/>
+        <p:cNvPr id="1" name="Shape 173"/>
         <p:cNvGrpSpPr/>
         <p:nvPr/>
       </p:nvGrpSpPr>
@@ -1918,7 +1796,7 @@
       </p:grpSpPr>
       <p:sp>
         <p:nvSpPr>
-          <p:cNvPr id="152" name="Google Shape;152;p9:notes"/>
+          <p:cNvPr id="174" name="Google Shape;174;p12:notes"/>
           <p:cNvSpPr txBox="1">
             <a:spLocks noGrp="1"/>
           </p:cNvSpPr>
@@ -1958,13 +1836,13 @@
               <a:buSzPts val="1100"/>
               <a:buNone/>
             </a:pPr>
-            <a:endParaRPr dirty="0"/>
+            <a:endParaRPr/>
           </a:p>
         </p:txBody>
       </p:sp>
       <p:sp>
         <p:nvSpPr>
-          <p:cNvPr id="153" name="Google Shape;153;p9:notes"/>
+          <p:cNvPr id="175" name="Google Shape;175;p12:notes"/>
           <p:cNvSpPr>
             <a:spLocks noGrp="1" noRot="1" noChangeAspect="1"/>
           </p:cNvSpPr>
@@ -16953,7 +16831,7 @@
         </p:blipFill>
         <p:spPr bwMode="auto">
           <a:xfrm>
-            <a:off x="6188684" y="1941033"/>
+            <a:off x="6724353" y="1949831"/>
             <a:ext cx="1411575" cy="1059417"/>
           </a:xfrm>
           <a:prstGeom prst="rect">
@@ -17000,7 +16878,7 @@
         </p:blipFill>
         <p:spPr bwMode="auto">
           <a:xfrm>
-            <a:off x="5962785" y="3503139"/>
+            <a:off x="6406537" y="3503139"/>
             <a:ext cx="2047208" cy="1151554"/>
           </a:xfrm>
           <a:prstGeom prst="rect">
@@ -17047,7 +16925,7 @@
         </p:blipFill>
         <p:spPr bwMode="auto">
           <a:xfrm>
-            <a:off x="2749869" y="2689549"/>
+            <a:off x="3017883" y="2689549"/>
             <a:ext cx="2929897" cy="1085995"/>
           </a:xfrm>
           <a:prstGeom prst="rect">
@@ -17079,8 +16957,8 @@
         </p:nvSpPr>
         <p:spPr>
           <a:xfrm>
-            <a:off x="1127669" y="1269368"/>
-            <a:ext cx="941283" cy="523220"/>
+            <a:off x="1239728" y="1357442"/>
+            <a:ext cx="1051891" cy="584775"/>
           </a:xfrm>
           <a:prstGeom prst="rect">
             <a:avLst/>
@@ -17094,7 +16972,7 @@
           <a:lstStyle/>
           <a:p>
             <a:r>
-              <a:rPr lang="en-US" sz="2800" dirty="0">
+              <a:rPr lang="en-US" sz="3200" dirty="0">
                 <a:latin typeface="Times New Roman" panose="02020603050405020304" pitchFamily="18" charset="0"/>
                 <a:cs typeface="Times New Roman" panose="02020603050405020304" pitchFamily="18" charset="0"/>
               </a:rPr>
@@ -17121,7 +16999,7 @@
         </p:nvSpPr>
         <p:spPr>
           <a:xfrm>
-            <a:off x="6060749" y="1214217"/>
+            <a:off x="6468484" y="1222681"/>
             <a:ext cx="1667444" cy="584775"/>
           </a:xfrm>
           <a:prstGeom prst="rect">
@@ -17176,39 +17054,6 @@
       </p:grpSpPr>
       <p:sp>
         <p:nvSpPr>
-          <p:cNvPr id="2" name="Заголовок 1">
-            <a:extLst>
-              <a:ext uri="{FF2B5EF4-FFF2-40B4-BE49-F238E27FC236}">
-                <a16:creationId xmlns:a16="http://schemas.microsoft.com/office/drawing/2014/main" id="{D1CE64D8-78DE-47A7-BB54-23F919E4B24A}"/>
-              </a:ext>
-            </a:extLst>
-          </p:cNvPr>
-          <p:cNvSpPr>
-            <a:spLocks noGrp="1"/>
-          </p:cNvSpPr>
-          <p:nvPr>
-            <p:ph type="title"/>
-          </p:nvPr>
-        </p:nvSpPr>
-        <p:spPr/>
-        <p:txBody>
-          <a:bodyPr/>
-          <a:lstStyle/>
-          <a:p>
-            <a:r>
-              <a:rPr lang="ru-RU" dirty="0" err="1"/>
-              <a:t>Демонстрац</a:t>
-            </a:r>
-            <a:r>
-              <a:rPr lang="uk-UA" dirty="0" err="1"/>
-              <a:t>ія</a:t>
-            </a:r>
-            <a:endParaRPr lang="uk-UA" dirty="0"/>
-          </a:p>
-        </p:txBody>
-      </p:sp>
-      <p:sp>
-        <p:nvSpPr>
           <p:cNvPr id="4" name="Місце для номера слайда 3">
             <a:extLst>
               <a:ext uri="{FF2B5EF4-FFF2-40B4-BE49-F238E27FC236}">
@@ -17263,7 +17108,7 @@
   <p:cSld>
     <p:spTree>
       <p:nvGrpSpPr>
-        <p:cNvPr id="1" name="Shape 154"/>
+        <p:cNvPr id="1" name=""/>
         <p:cNvGrpSpPr/>
         <p:nvPr/>
       </p:nvGrpSpPr>
@@ -17277,87 +17122,133 @@
       </p:grpSpPr>
       <p:sp>
         <p:nvSpPr>
-          <p:cNvPr id="155" name="Google Shape;155;p21"/>
-          <p:cNvSpPr txBox="1">
+          <p:cNvPr id="2" name="Заголовок 1">
+            <a:extLst>
+              <a:ext uri="{FF2B5EF4-FFF2-40B4-BE49-F238E27FC236}">
+                <a16:creationId xmlns:a16="http://schemas.microsoft.com/office/drawing/2014/main" id="{1224FBA3-AC53-4AB8-AF8A-691F0F742B98}"/>
+              </a:ext>
+            </a:extLst>
+          </p:cNvPr>
+          <p:cNvSpPr>
             <a:spLocks noGrp="1"/>
           </p:cNvSpPr>
           <p:nvPr>
             <p:ph type="title"/>
           </p:nvPr>
         </p:nvSpPr>
-        <p:spPr>
-          <a:xfrm>
-            <a:off x="1188598" y="80472"/>
-            <a:ext cx="7498200" cy="857400"/>
-          </a:xfrm>
-          <a:prstGeom prst="rect">
-            <a:avLst/>
-          </a:prstGeom>
-          <a:noFill/>
-          <a:ln>
-            <a:noFill/>
-          </a:ln>
-        </p:spPr>
+        <p:spPr/>
         <p:txBody>
-          <a:bodyPr spcFirstLastPara="1" wrap="square" lIns="91425" tIns="45700" rIns="91425" bIns="45700" anchor="ctr" anchorCtr="0">
-            <a:normAutofit/>
-          </a:bodyPr>
+          <a:bodyPr/>
           <a:lstStyle/>
           <a:p>
-            <a:pPr marL="0" lvl="0" indent="0" algn="l" rtl="0">
-              <a:lnSpc>
-                <a:spcPct val="100000"/>
-              </a:lnSpc>
-              <a:spcBef>
-                <a:spcPts val="0"/>
-              </a:spcBef>
-              <a:spcAft>
-                <a:spcPts val="0"/>
-              </a:spcAft>
-              <a:buClr>
-                <a:srgbClr val="562214"/>
-              </a:buClr>
-              <a:buSzPts val="4300"/>
-              <a:buFont typeface="Gill Sans"/>
-              <a:buNone/>
-            </a:pPr>
             <a:r>
-              <a:rPr lang="ru-RU" dirty="0" err="1">
-                <a:latin typeface="Times New Roman" panose="02020603050405020304" pitchFamily="18" charset="0"/>
-                <a:cs typeface="Times New Roman" panose="02020603050405020304" pitchFamily="18" charset="0"/>
-              </a:rPr>
+              <a:rPr lang="uk-UA" dirty="0"/>
               <a:t>Висновки</a:t>
             </a:r>
-            <a:endParaRPr dirty="0">
-              <a:latin typeface="Times New Roman" panose="02020603050405020304" pitchFamily="18" charset="0"/>
-              <a:cs typeface="Times New Roman" panose="02020603050405020304" pitchFamily="18" charset="0"/>
-            </a:endParaRPr>
           </a:p>
         </p:txBody>
       </p:sp>
       <p:sp>
         <p:nvSpPr>
-          <p:cNvPr id="157" name="Google Shape;157;p21"/>
-          <p:cNvSpPr txBox="1">
+          <p:cNvPr id="3" name="Місце для тексту 2">
+            <a:extLst>
+              <a:ext uri="{FF2B5EF4-FFF2-40B4-BE49-F238E27FC236}">
+                <a16:creationId xmlns:a16="http://schemas.microsoft.com/office/drawing/2014/main" id="{6E00B844-5B4B-493D-A7F1-DFABF477738C}"/>
+              </a:ext>
+            </a:extLst>
+          </p:cNvPr>
+          <p:cNvSpPr>
+            <a:spLocks noGrp="1"/>
+          </p:cNvSpPr>
+          <p:nvPr>
+            <p:ph type="body" idx="1"/>
+          </p:nvPr>
+        </p:nvSpPr>
+        <p:spPr/>
+        <p:txBody>
+          <a:bodyPr>
+            <a:normAutofit fontScale="55000" lnSpcReduction="20000"/>
+          </a:bodyPr>
+          <a:lstStyle/>
+          <a:p>
+            <a:pPr marL="137160" indent="0">
+              <a:lnSpc>
+                <a:spcPct val="120000"/>
+              </a:lnSpc>
+              <a:buNone/>
+            </a:pPr>
+            <a:r>
+              <a:rPr lang="uk-UA" dirty="0"/>
+              <a:t>Результатом виконання дипломного проєкту було створено демонстраційний ігровий застосунок у жанрі </a:t>
+            </a:r>
+            <a:r>
+              <a:rPr lang="en-US" dirty="0"/>
+              <a:t>RPG, </a:t>
+            </a:r>
+            <a:r>
+              <a:rPr lang="uk-UA" dirty="0"/>
+              <a:t>що демонструє 4 різні типи ігрових класів </a:t>
+            </a:r>
+            <a:r>
+              <a:rPr lang="en-US" dirty="0"/>
+              <a:t>NPC, </a:t>
+            </a:r>
+            <a:r>
+              <a:rPr lang="uk-UA" dirty="0"/>
+              <a:t>кожен з яких оснащений власною системою прийняття рішень на основі заданих параметрів, ігровий інтерфейс, бойову систему, економіку, інвентар, класи, характеристики та взаємодію з великою кількістю ігрових об’єктів.</a:t>
+            </a:r>
+          </a:p>
+          <a:p>
+            <a:pPr marL="137160" indent="0">
+              <a:lnSpc>
+                <a:spcPct val="120000"/>
+              </a:lnSpc>
+              <a:buNone/>
+            </a:pPr>
+            <a:br>
+              <a:rPr lang="en-US" dirty="0"/>
+            </a:br>
+            <a:r>
+              <a:rPr lang="uk-UA" dirty="0"/>
+              <a:t>Також було проведено  аналіз існуючих рішень в інших ігрових додатках. На відміну від них, в грі </a:t>
+            </a:r>
+            <a:r>
+              <a:rPr lang="en-US" dirty="0"/>
+              <a:t>NPC </a:t>
+            </a:r>
+            <a:r>
+              <a:rPr lang="ru-RU" dirty="0"/>
+              <a:t>не просто стоять на місці, а демонструють унікальну для них поведінку (патрулювання, переслідування, збереження свого життя, виклик допомоги). Також вони мають систему зору,  що забезпечує більшу реалістичність ігровому світу.</a:t>
+            </a:r>
+            <a:endParaRPr lang="uk-UA" dirty="0"/>
+          </a:p>
+          <a:p>
+            <a:pPr marL="137160" indent="0">
+              <a:buNone/>
+            </a:pPr>
+            <a:endParaRPr lang="uk-UA" dirty="0"/>
+          </a:p>
+        </p:txBody>
+      </p:sp>
+      <p:sp>
+        <p:nvSpPr>
+          <p:cNvPr id="4" name="Місце для номера слайда 3">
+            <a:extLst>
+              <a:ext uri="{FF2B5EF4-FFF2-40B4-BE49-F238E27FC236}">
+                <a16:creationId xmlns:a16="http://schemas.microsoft.com/office/drawing/2014/main" id="{9B5753EA-B289-45B6-84ED-F0179AC5DBDD}"/>
+              </a:ext>
+            </a:extLst>
+          </p:cNvPr>
+          <p:cNvSpPr>
             <a:spLocks noGrp="1"/>
           </p:cNvSpPr>
           <p:nvPr>
             <p:ph type="sldNum" idx="12"/>
           </p:nvPr>
         </p:nvSpPr>
-        <p:spPr>
-          <a:xfrm>
-            <a:off x="8686798" y="-12"/>
-            <a:ext cx="457200" cy="357000"/>
-          </a:xfrm>
-          <a:prstGeom prst="rect">
-            <a:avLst/>
-          </a:prstGeom>
-        </p:spPr>
+        <p:spPr/>
         <p:txBody>
-          <a:bodyPr spcFirstLastPara="1" wrap="square" lIns="91425" tIns="45700" rIns="91425" bIns="45700" anchor="b" anchorCtr="0">
-            <a:noAutofit/>
-          </a:bodyPr>
+          <a:bodyPr/>
           <a:lstStyle/>
           <a:p>
             <a:pPr marL="0" lvl="0" indent="0" algn="ctr" rtl="0">
@@ -17367,560 +17258,22 @@
               <a:spcAft>
                 <a:spcPts val="0"/>
               </a:spcAft>
-              <a:buClr>
-                <a:srgbClr val="000000"/>
-              </a:buClr>
-              <a:buSzPts val="1200"/>
-              <a:buFont typeface="Arial"/>
               <a:buNone/>
             </a:pPr>
             <a:fld id="{00000000-1234-1234-1234-123412341234}" type="slidenum">
-              <a:rPr lang="ru-RU"/>
+              <a:rPr lang="ru-RU" smtClean="0"/>
               <a:t>13</a:t>
             </a:fld>
-            <a:endParaRPr/>
-          </a:p>
-        </p:txBody>
-      </p:sp>
-      <p:sp>
-        <p:nvSpPr>
-          <p:cNvPr id="4" name="TextBox 3">
-            <a:extLst>
-              <a:ext uri="{FF2B5EF4-FFF2-40B4-BE49-F238E27FC236}">
-                <a16:creationId xmlns:a16="http://schemas.microsoft.com/office/drawing/2014/main" id="{A25BE7FA-C113-49EC-B9D9-361EBCDABDFA}"/>
-              </a:ext>
-            </a:extLst>
-          </p:cNvPr>
-          <p:cNvSpPr txBox="1"/>
-          <p:nvPr/>
-        </p:nvSpPr>
-        <p:spPr>
-          <a:xfrm>
-            <a:off x="984890" y="740649"/>
-            <a:ext cx="7930508" cy="4093428"/>
-          </a:xfrm>
-          <a:prstGeom prst="rect">
-            <a:avLst/>
-          </a:prstGeom>
-          <a:noFill/>
-        </p:spPr>
-        <p:txBody>
-          <a:bodyPr wrap="square" rtlCol="0">
-            <a:spAutoFit/>
-          </a:bodyPr>
-          <a:lstStyle/>
-          <a:p>
-            <a:pPr marL="0" lvl="0" indent="0" algn="just" rtl="0">
-              <a:lnSpc>
-                <a:spcPct val="100000"/>
-              </a:lnSpc>
-              <a:spcBef>
-                <a:spcPts val="0"/>
-              </a:spcBef>
-              <a:spcAft>
-                <a:spcPts val="0"/>
-              </a:spcAft>
-              <a:buSzPts val="2560"/>
-              <a:buNone/>
-            </a:pPr>
-            <a:r>
-              <a:rPr lang="ru-RU" sz="1200" dirty="0">
-                <a:latin typeface="Times New Roman" panose="02020603050405020304" pitchFamily="18" charset="0"/>
-                <a:cs typeface="Times New Roman" panose="02020603050405020304" pitchFamily="18" charset="0"/>
-              </a:rPr>
-              <a:t>	</a:t>
-            </a:r>
-            <a:r>
-              <a:rPr lang="uk-UA" sz="1300" dirty="0">
-                <a:latin typeface="Times New Roman" panose="02020603050405020304" pitchFamily="18" charset="0"/>
-                <a:cs typeface="Times New Roman" panose="02020603050405020304" pitchFamily="18" charset="0"/>
-              </a:rPr>
-              <a:t>В результаті виконання дипломного проєкту спроєктовано та реалізовано наступні етапи.</a:t>
-            </a:r>
-          </a:p>
-          <a:p>
-            <a:pPr marL="0" lvl="0" indent="0" algn="just" rtl="0">
-              <a:lnSpc>
-                <a:spcPct val="100000"/>
-              </a:lnSpc>
-              <a:spcBef>
-                <a:spcPts val="0"/>
-              </a:spcBef>
-              <a:spcAft>
-                <a:spcPts val="0"/>
-              </a:spcAft>
-              <a:buSzPts val="2560"/>
-              <a:buNone/>
-            </a:pPr>
-            <a:r>
-              <a:rPr lang="uk-UA" sz="1300" dirty="0">
-                <a:latin typeface="Times New Roman" panose="02020603050405020304" pitchFamily="18" charset="0"/>
-                <a:cs typeface="Times New Roman" panose="02020603050405020304" pitchFamily="18" charset="0"/>
-              </a:rPr>
-              <a:t>	Проведено аналіз існуючих моделей поведінки </a:t>
-            </a:r>
-            <a:r>
-              <a:rPr lang="en-US" sz="1300" dirty="0">
-                <a:latin typeface="Times New Roman" panose="02020603050405020304" pitchFamily="18" charset="0"/>
-                <a:cs typeface="Times New Roman" panose="02020603050405020304" pitchFamily="18" charset="0"/>
-              </a:rPr>
-              <a:t>NPC </a:t>
-            </a:r>
-            <a:r>
-              <a:rPr lang="uk-UA" sz="1300" dirty="0">
-                <a:latin typeface="Times New Roman" panose="02020603050405020304" pitchFamily="18" charset="0"/>
-                <a:cs typeface="Times New Roman" panose="02020603050405020304" pitchFamily="18" charset="0"/>
-              </a:rPr>
-              <a:t>та різних жанрів ігор.</a:t>
-            </a:r>
-            <a:br>
-              <a:rPr lang="uk-UA" sz="1300" dirty="0">
-                <a:latin typeface="Times New Roman" panose="02020603050405020304" pitchFamily="18" charset="0"/>
-                <a:cs typeface="Times New Roman" panose="02020603050405020304" pitchFamily="18" charset="0"/>
-              </a:rPr>
-            </a:br>
-            <a:r>
-              <a:rPr lang="uk-UA" sz="1300" dirty="0">
-                <a:latin typeface="Times New Roman" panose="02020603050405020304" pitchFamily="18" charset="0"/>
-                <a:cs typeface="Times New Roman" panose="02020603050405020304" pitchFamily="18" charset="0"/>
-              </a:rPr>
-              <a:t>	Демонстраційну гру, що включає в себе механіки:</a:t>
-            </a:r>
-          </a:p>
-          <a:p>
-            <a:pPr marL="0" lvl="0" indent="0" algn="just" rtl="0">
-              <a:lnSpc>
-                <a:spcPct val="100000"/>
-              </a:lnSpc>
-              <a:spcBef>
-                <a:spcPts val="0"/>
-              </a:spcBef>
-              <a:spcAft>
-                <a:spcPts val="0"/>
-              </a:spcAft>
-              <a:buSzPts val="2560"/>
-              <a:buNone/>
-            </a:pPr>
-            <a:r>
-              <a:rPr lang="en-US" sz="1300" i="1" dirty="0">
-                <a:latin typeface="Times New Roman" panose="02020603050405020304" pitchFamily="18" charset="0"/>
-                <a:cs typeface="Times New Roman" panose="02020603050405020304" pitchFamily="18" charset="0"/>
-              </a:rPr>
-              <a:t>	</a:t>
-            </a:r>
-            <a:r>
-              <a:rPr lang="uk-UA" sz="1300" i="1" dirty="0">
-                <a:latin typeface="Times New Roman" panose="02020603050405020304" pitchFamily="18" charset="0"/>
-                <a:cs typeface="Times New Roman" panose="02020603050405020304" pitchFamily="18" charset="0"/>
-              </a:rPr>
-              <a:t>Поведінки </a:t>
-            </a:r>
-            <a:r>
-              <a:rPr lang="en-US" sz="1300" i="1" dirty="0">
-                <a:latin typeface="Times New Roman" panose="02020603050405020304" pitchFamily="18" charset="0"/>
-                <a:cs typeface="Times New Roman" panose="02020603050405020304" pitchFamily="18" charset="0"/>
-              </a:rPr>
-              <a:t>NPC</a:t>
-            </a:r>
-            <a:r>
-              <a:rPr lang="uk-UA" sz="1300" i="1" dirty="0">
-                <a:latin typeface="Times New Roman" panose="02020603050405020304" pitchFamily="18" charset="0"/>
-                <a:cs typeface="Times New Roman" panose="02020603050405020304" pitchFamily="18" charset="0"/>
-              </a:rPr>
-              <a:t> </a:t>
-            </a:r>
-            <a:r>
-              <a:rPr lang="uk-UA" sz="1300" dirty="0">
-                <a:latin typeface="Times New Roman" panose="02020603050405020304" pitchFamily="18" charset="0"/>
-                <a:cs typeface="Times New Roman" panose="02020603050405020304" pitchFamily="18" charset="0"/>
-              </a:rPr>
-              <a:t>- В ігровому застосунку наявні </a:t>
-            </a:r>
-            <a:r>
-              <a:rPr lang="ru-RU" sz="1300" dirty="0">
-                <a:latin typeface="Times New Roman" panose="02020603050405020304" pitchFamily="18" charset="0"/>
-                <a:ea typeface="Times New Roman" panose="02020603050405020304" pitchFamily="18" charset="0"/>
-              </a:rPr>
-              <a:t>4 </a:t>
-            </a:r>
-            <a:r>
-              <a:rPr lang="ru-RU" sz="1300" dirty="0" err="1">
-                <a:latin typeface="Times New Roman" panose="02020603050405020304" pitchFamily="18" charset="0"/>
-                <a:ea typeface="Times New Roman" panose="02020603050405020304" pitchFamily="18" charset="0"/>
-              </a:rPr>
-              <a:t>різні</a:t>
-            </a:r>
-            <a:r>
-              <a:rPr lang="ru-RU" sz="1300" dirty="0">
-                <a:latin typeface="Times New Roman" panose="02020603050405020304" pitchFamily="18" charset="0"/>
-                <a:ea typeface="Times New Roman" panose="02020603050405020304" pitchFamily="18" charset="0"/>
-              </a:rPr>
-              <a:t> типи ігрових класів NPC, кожен з яких оснащений власною системою прийняття рішень на основі заданих параметрів</a:t>
-            </a:r>
-            <a:r>
-              <a:rPr lang="en-US" sz="1300" dirty="0">
-                <a:latin typeface="Times New Roman" panose="02020603050405020304" pitchFamily="18" charset="0"/>
-                <a:ea typeface="Times New Roman" panose="02020603050405020304" pitchFamily="18" charset="0"/>
-              </a:rPr>
-              <a:t>.</a:t>
-            </a:r>
-            <a:r>
-              <a:rPr lang="ru-RU" sz="1300" dirty="0">
-                <a:latin typeface="Times New Roman" panose="02020603050405020304" pitchFamily="18" charset="0"/>
-                <a:ea typeface="Times New Roman" panose="02020603050405020304" pitchFamily="18" charset="0"/>
-              </a:rPr>
-              <a:t> </a:t>
-            </a:r>
-            <a:r>
-              <a:rPr lang="en-US" sz="1300" i="1" dirty="0">
-                <a:latin typeface="Times New Roman" panose="02020603050405020304" pitchFamily="18" charset="0"/>
-                <a:cs typeface="Times New Roman" panose="02020603050405020304" pitchFamily="18" charset="0"/>
-              </a:rPr>
-              <a:t>	</a:t>
-            </a:r>
-            <a:endParaRPr lang="uk-UA" sz="1300" i="1" dirty="0">
-              <a:latin typeface="Times New Roman" panose="02020603050405020304" pitchFamily="18" charset="0"/>
-              <a:cs typeface="Times New Roman" panose="02020603050405020304" pitchFamily="18" charset="0"/>
-            </a:endParaRPr>
-          </a:p>
-          <a:p>
-            <a:pPr marL="0" lvl="0" indent="0" algn="just" rtl="0">
-              <a:lnSpc>
-                <a:spcPct val="100000"/>
-              </a:lnSpc>
-              <a:spcBef>
-                <a:spcPts val="0"/>
-              </a:spcBef>
-              <a:spcAft>
-                <a:spcPts val="0"/>
-              </a:spcAft>
-              <a:buSzPts val="2560"/>
-              <a:buNone/>
-            </a:pPr>
-            <a:r>
-              <a:rPr lang="uk-UA" sz="1300" i="1" dirty="0">
-                <a:latin typeface="Times New Roman" panose="02020603050405020304" pitchFamily="18" charset="0"/>
-                <a:cs typeface="Times New Roman" panose="02020603050405020304" pitchFamily="18" charset="0"/>
-              </a:rPr>
-              <a:t>	Ігрового інтерфейсу</a:t>
-            </a:r>
-            <a:r>
-              <a:rPr lang="en-US" sz="1300" i="1" dirty="0">
-                <a:latin typeface="Times New Roman" panose="02020603050405020304" pitchFamily="18" charset="0"/>
-                <a:cs typeface="Times New Roman" panose="02020603050405020304" pitchFamily="18" charset="0"/>
-              </a:rPr>
-              <a:t> </a:t>
-            </a:r>
-            <a:r>
-              <a:rPr lang="en-US" sz="1300" dirty="0">
-                <a:latin typeface="Times New Roman" panose="02020603050405020304" pitchFamily="18" charset="0"/>
-                <a:cs typeface="Times New Roman" panose="02020603050405020304" pitchFamily="18" charset="0"/>
-              </a:rPr>
-              <a:t>- </a:t>
-            </a:r>
-            <a:r>
-              <a:rPr lang="uk-UA" sz="1300" dirty="0">
-                <a:latin typeface="Times New Roman" panose="02020603050405020304" pitchFamily="18" charset="0"/>
-                <a:cs typeface="Times New Roman" panose="02020603050405020304" pitchFamily="18" charset="0"/>
-              </a:rPr>
-              <a:t>Гравець має можливість користуватися інтерфейсом застосунку таким як, меню, інвентар, магазини, об’єкти і тд</a:t>
-            </a:r>
-            <a:r>
-              <a:rPr lang="en-US" sz="1300" dirty="0">
-                <a:latin typeface="Times New Roman" panose="02020603050405020304" pitchFamily="18" charset="0"/>
-                <a:cs typeface="Times New Roman" panose="02020603050405020304" pitchFamily="18" charset="0"/>
-              </a:rPr>
-              <a:t>.</a:t>
-            </a:r>
-          </a:p>
-          <a:p>
-            <a:pPr marL="0" lvl="0" indent="0" algn="just" rtl="0">
-              <a:lnSpc>
-                <a:spcPct val="100000"/>
-              </a:lnSpc>
-              <a:spcBef>
-                <a:spcPts val="0"/>
-              </a:spcBef>
-              <a:spcAft>
-                <a:spcPts val="0"/>
-              </a:spcAft>
-              <a:buSzPts val="2560"/>
-              <a:buNone/>
-            </a:pPr>
-            <a:r>
-              <a:rPr lang="en-US" sz="1300" i="1" dirty="0">
-                <a:latin typeface="Times New Roman" panose="02020603050405020304" pitchFamily="18" charset="0"/>
-                <a:cs typeface="Times New Roman" panose="02020603050405020304" pitchFamily="18" charset="0"/>
-              </a:rPr>
-              <a:t>	</a:t>
-            </a:r>
-            <a:r>
-              <a:rPr lang="ru-RU" sz="1300" i="1" dirty="0">
-                <a:latin typeface="Times New Roman" panose="02020603050405020304" pitchFamily="18" charset="0"/>
-                <a:cs typeface="Times New Roman" panose="02020603050405020304" pitchFamily="18" charset="0"/>
-              </a:rPr>
-              <a:t>Бою</a:t>
-            </a:r>
-            <a:r>
-              <a:rPr lang="ru-RU" sz="1300" dirty="0">
-                <a:latin typeface="Times New Roman" panose="02020603050405020304" pitchFamily="18" charset="0"/>
-                <a:cs typeface="Times New Roman" panose="02020603050405020304" pitchFamily="18" charset="0"/>
-              </a:rPr>
-              <a:t> - </a:t>
-            </a:r>
-            <a:r>
-              <a:rPr lang="en-US" sz="1300" dirty="0">
-                <a:latin typeface="Times New Roman" panose="02020603050405020304" pitchFamily="18" charset="0"/>
-                <a:cs typeface="Times New Roman" panose="02020603050405020304" pitchFamily="18" charset="0"/>
-              </a:rPr>
-              <a:t> </a:t>
-            </a:r>
-            <a:r>
-              <a:rPr lang="uk-UA" sz="1300" dirty="0">
-                <a:latin typeface="Times New Roman" panose="02020603050405020304" pitchFamily="18" charset="0"/>
-                <a:cs typeface="Times New Roman" panose="02020603050405020304" pitchFamily="18" charset="0"/>
-              </a:rPr>
-              <a:t>Гравець може взаємодіяти з усіма </a:t>
-            </a:r>
-            <a:r>
-              <a:rPr lang="en-US" sz="1300" dirty="0">
-                <a:latin typeface="Times New Roman" panose="02020603050405020304" pitchFamily="18" charset="0"/>
-                <a:cs typeface="Times New Roman" panose="02020603050405020304" pitchFamily="18" charset="0"/>
-              </a:rPr>
-              <a:t>NPC</a:t>
-            </a:r>
-            <a:r>
-              <a:rPr lang="uk-UA" sz="1300" dirty="0">
-                <a:latin typeface="Times New Roman" panose="02020603050405020304" pitchFamily="18" charset="0"/>
-                <a:cs typeface="Times New Roman" panose="02020603050405020304" pitchFamily="18" charset="0"/>
-              </a:rPr>
-              <a:t> в грі, знищувати їх, наносити їм шкоду, використовувати для цього 6 видів зброї, </a:t>
-            </a:r>
-            <a:r>
-              <a:rPr lang="en-US" sz="1300" dirty="0">
-                <a:latin typeface="Times New Roman" panose="02020603050405020304" pitchFamily="18" charset="0"/>
-                <a:cs typeface="Times New Roman" panose="02020603050405020304" pitchFamily="18" charset="0"/>
-              </a:rPr>
-              <a:t>13 </a:t>
-            </a:r>
-            <a:r>
-              <a:rPr lang="ru-RU" sz="1300" dirty="0" err="1">
-                <a:latin typeface="Times New Roman" panose="02020603050405020304" pitchFamily="18" charset="0"/>
-                <a:cs typeface="Times New Roman" panose="02020603050405020304" pitchFamily="18" charset="0"/>
-              </a:rPr>
-              <a:t>видів</a:t>
-            </a:r>
-            <a:r>
-              <a:rPr lang="ru-RU" sz="1300" dirty="0">
-                <a:latin typeface="Times New Roman" panose="02020603050405020304" pitchFamily="18" charset="0"/>
-                <a:cs typeface="Times New Roman" panose="02020603050405020304" pitchFamily="18" charset="0"/>
-              </a:rPr>
-              <a:t> </a:t>
-            </a:r>
-            <a:r>
-              <a:rPr lang="uk-UA" sz="1300" dirty="0">
-                <a:latin typeface="Times New Roman" panose="02020603050405020304" pitchFamily="18" charset="0"/>
-                <a:cs typeface="Times New Roman" panose="02020603050405020304" pitchFamily="18" charset="0"/>
-              </a:rPr>
-              <a:t>заклять та екіпірувати броню для захисту себе.</a:t>
-            </a:r>
-          </a:p>
-          <a:p>
-            <a:pPr marL="0" lvl="0" indent="0" algn="just" rtl="0">
-              <a:lnSpc>
-                <a:spcPct val="100000"/>
-              </a:lnSpc>
-              <a:spcBef>
-                <a:spcPts val="0"/>
-              </a:spcBef>
-              <a:spcAft>
-                <a:spcPts val="0"/>
-              </a:spcAft>
-              <a:buSzPts val="2560"/>
-              <a:buNone/>
-            </a:pPr>
-            <a:r>
-              <a:rPr lang="en-US" sz="1300" dirty="0">
-                <a:latin typeface="Times New Roman" panose="02020603050405020304" pitchFamily="18" charset="0"/>
-                <a:cs typeface="Times New Roman" panose="02020603050405020304" pitchFamily="18" charset="0"/>
-              </a:rPr>
-              <a:t>	</a:t>
-            </a:r>
-            <a:r>
-              <a:rPr lang="uk-UA" sz="1300" i="1" dirty="0">
-                <a:latin typeface="Times New Roman" panose="02020603050405020304" pitchFamily="18" charset="0"/>
-                <a:cs typeface="Times New Roman" panose="02020603050405020304" pitchFamily="18" charset="0"/>
-              </a:rPr>
-              <a:t>Інвентарю, магазинів та ігрової економіки </a:t>
-            </a:r>
-            <a:r>
-              <a:rPr lang="uk-UA" sz="1300" dirty="0">
-                <a:latin typeface="Times New Roman" panose="02020603050405020304" pitchFamily="18" charset="0"/>
-                <a:cs typeface="Times New Roman" panose="02020603050405020304" pitchFamily="18" charset="0"/>
-              </a:rPr>
-              <a:t>- Гравець може купувати та використовувати всі предмети, які наявні в грі, для цього існують магазини та інвентар. Інвентар в свою чергу існує, як місце збереження та колекціонування об’єктів, отриманих гравцем. Також там можна знайти поточні задання, карту, меню зброї, характеристик, магії та можливість прокачувати свого песронажа</a:t>
-            </a:r>
-            <a:r>
-              <a:rPr lang="en-US" sz="1300" dirty="0">
-                <a:latin typeface="Times New Roman" panose="02020603050405020304" pitchFamily="18" charset="0"/>
-                <a:cs typeface="Times New Roman" panose="02020603050405020304" pitchFamily="18" charset="0"/>
-              </a:rPr>
-              <a:t>.</a:t>
-            </a:r>
-            <a:endParaRPr lang="uk-UA" sz="1300" dirty="0">
-              <a:latin typeface="Times New Roman" panose="02020603050405020304" pitchFamily="18" charset="0"/>
-              <a:cs typeface="Times New Roman" panose="02020603050405020304" pitchFamily="18" charset="0"/>
-            </a:endParaRPr>
-          </a:p>
-          <a:p>
-            <a:pPr algn="just">
-              <a:buSzPts val="2560"/>
-            </a:pPr>
-            <a:r>
-              <a:rPr lang="uk-UA" sz="1300" dirty="0">
-                <a:latin typeface="Times New Roman" panose="02020603050405020304" pitchFamily="18" charset="0"/>
-                <a:cs typeface="Times New Roman" panose="02020603050405020304" pitchFamily="18" charset="0"/>
-              </a:rPr>
-              <a:t>	</a:t>
-            </a:r>
-            <a:r>
-              <a:rPr lang="uk-UA" sz="1300" i="1" dirty="0">
-                <a:latin typeface="Times New Roman" panose="02020603050405020304" pitchFamily="18" charset="0"/>
-                <a:cs typeface="Times New Roman" panose="02020603050405020304" pitchFamily="18" charset="0"/>
-              </a:rPr>
-              <a:t>Взаємодії з ігровими об’єктами та предметами середовища </a:t>
-            </a:r>
-            <a:r>
-              <a:rPr lang="uk-UA" sz="1300" dirty="0">
-                <a:latin typeface="Times New Roman" panose="02020603050405020304" pitchFamily="18" charset="0"/>
-                <a:cs typeface="Times New Roman" panose="02020603050405020304" pitchFamily="18" charset="0"/>
-              </a:rPr>
-              <a:t>- </a:t>
-            </a:r>
-            <a:r>
-              <a:rPr lang="uk-UA" sz="1300" b="0" i="0" u="none" strike="noStrike" baseline="0" dirty="0">
-                <a:solidFill>
-                  <a:srgbClr val="000000"/>
-                </a:solidFill>
-                <a:latin typeface="Times New Roman" panose="02020603050405020304" pitchFamily="18" charset="0"/>
-                <a:cs typeface="Times New Roman" panose="02020603050405020304" pitchFamily="18" charset="0"/>
-              </a:rPr>
-              <a:t>Гравець може взаємодіяти з великою кількістю</a:t>
-            </a:r>
-            <a:r>
-              <a:rPr lang="en-US" sz="1300" dirty="0">
-                <a:solidFill>
-                  <a:srgbClr val="000000"/>
-                </a:solidFill>
-                <a:latin typeface="Times New Roman" panose="02020603050405020304" pitchFamily="18" charset="0"/>
-                <a:cs typeface="Times New Roman" panose="02020603050405020304" pitchFamily="18" charset="0"/>
-              </a:rPr>
-              <a:t> </a:t>
-            </a:r>
-            <a:r>
-              <a:rPr lang="uk-UA" sz="1300" b="0" i="0" u="none" strike="noStrike" baseline="0" dirty="0">
-                <a:latin typeface="Times New Roman" panose="02020603050405020304" pitchFamily="18" charset="0"/>
-                <a:cs typeface="Times New Roman" panose="02020603050405020304" pitchFamily="18" charset="0"/>
-              </a:rPr>
-              <a:t>об'єктів, які розкидані по всьому світу. Також є можливість взаємодіяти зі скринями, НПС, ящиками і тд. </a:t>
-            </a:r>
-            <a:r>
-              <a:rPr lang="uk-UA" sz="1300" dirty="0">
-                <a:latin typeface="Times New Roman" panose="02020603050405020304" pitchFamily="18" charset="0"/>
-                <a:cs typeface="Times New Roman" panose="02020603050405020304" pitchFamily="18" charset="0"/>
-              </a:rPr>
-              <a:t> </a:t>
-            </a:r>
-          </a:p>
-          <a:p>
-            <a:pPr marL="0" lvl="0" indent="0" algn="just" rtl="0">
-              <a:lnSpc>
-                <a:spcPct val="100000"/>
-              </a:lnSpc>
-              <a:spcBef>
-                <a:spcPts val="0"/>
-              </a:spcBef>
-              <a:spcAft>
-                <a:spcPts val="0"/>
-              </a:spcAft>
-              <a:buSzPts val="2560"/>
-              <a:buNone/>
-            </a:pPr>
-            <a:r>
-              <a:rPr lang="uk-UA" sz="1300" dirty="0">
-                <a:latin typeface="Times New Roman" panose="02020603050405020304" pitchFamily="18" charset="0"/>
-                <a:cs typeface="Times New Roman" panose="02020603050405020304" pitchFamily="18" charset="0"/>
-              </a:rPr>
-              <a:t>	</a:t>
-            </a:r>
-            <a:r>
-              <a:rPr lang="ru-RU" sz="1300" dirty="0" err="1">
-                <a:latin typeface="Times New Roman" panose="02020603050405020304" pitchFamily="18" charset="0"/>
-                <a:cs typeface="Times New Roman" panose="02020603050405020304" pitchFamily="18" charset="0"/>
-              </a:rPr>
-              <a:t>Здійснено</a:t>
-            </a:r>
-            <a:r>
-              <a:rPr lang="ru-RU" sz="1300" dirty="0">
-                <a:latin typeface="Times New Roman" panose="02020603050405020304" pitchFamily="18" charset="0"/>
-                <a:cs typeface="Times New Roman" panose="02020603050405020304" pitchFamily="18" charset="0"/>
-              </a:rPr>
-              <a:t> </a:t>
-            </a:r>
-            <a:r>
-              <a:rPr lang="ru-RU" sz="1300" dirty="0" err="1">
-                <a:latin typeface="Times New Roman" panose="02020603050405020304" pitchFamily="18" charset="0"/>
-                <a:cs typeface="Times New Roman" panose="02020603050405020304" pitchFamily="18" charset="0"/>
-              </a:rPr>
-              <a:t>успіщне</a:t>
-            </a:r>
-            <a:r>
-              <a:rPr lang="ru-RU" sz="1300" dirty="0">
-                <a:latin typeface="Times New Roman" panose="02020603050405020304" pitchFamily="18" charset="0"/>
-                <a:cs typeface="Times New Roman" panose="02020603050405020304" pitchFamily="18" charset="0"/>
-              </a:rPr>
-              <a:t> тестування розроблених ігрових механік.</a:t>
-            </a:r>
-            <a:r>
-              <a:rPr lang="uk-UA" sz="1300" dirty="0">
-                <a:latin typeface="Times New Roman" panose="02020603050405020304" pitchFamily="18" charset="0"/>
-                <a:cs typeface="Times New Roman" panose="02020603050405020304" pitchFamily="18" charset="0"/>
-              </a:rPr>
-              <a:t> </a:t>
-            </a:r>
-          </a:p>
-          <a:p>
-            <a:pPr marL="0" lvl="0" indent="0" algn="just" rtl="0">
-              <a:lnSpc>
-                <a:spcPct val="100000"/>
-              </a:lnSpc>
-              <a:spcBef>
-                <a:spcPts val="0"/>
-              </a:spcBef>
-              <a:spcAft>
-                <a:spcPts val="0"/>
-              </a:spcAft>
-              <a:buSzPts val="2560"/>
-              <a:buNone/>
-            </a:pPr>
-            <a:r>
-              <a:rPr lang="ru-RU" sz="1300" dirty="0">
-                <a:latin typeface="Times New Roman" panose="02020603050405020304" pitchFamily="18" charset="0"/>
-                <a:ea typeface="Times New Roman" panose="02020603050405020304" pitchFamily="18" charset="0"/>
-              </a:rPr>
-              <a:t>	</a:t>
-            </a:r>
-            <a:r>
-              <a:rPr lang="uk-UA" sz="1300" dirty="0">
-                <a:latin typeface="Times New Roman" panose="02020603050405020304" pitchFamily="18" charset="0"/>
-                <a:cs typeface="Times New Roman" panose="02020603050405020304" pitchFamily="18" charset="0"/>
-              </a:rPr>
-              <a:t> Розробка ігрового застосунку на дипломному проєкті дала можливість заглибитися у вивчення розробки відеоігор та покращити навички в розумінні та створенні всіх аспектів гри, особливо поведінки інтелектуальних агентів.</a:t>
-            </a:r>
+            <a:endParaRPr lang="ru-RU" dirty="0"/>
           </a:p>
         </p:txBody>
       </p:sp>
     </p:spTree>
+    <p:extLst>
+      <p:ext uri="{BB962C8B-B14F-4D97-AF65-F5344CB8AC3E}">
+        <p14:creationId xmlns:p14="http://schemas.microsoft.com/office/powerpoint/2010/main" val="210709716"/>
+      </p:ext>
+    </p:extLst>
   </p:cSld>
   <p:clrMapOvr>
     <a:masterClrMapping/>
@@ -19140,7 +18493,7 @@
           </a:bodyPr>
           <a:lstStyle/>
           <a:p>
-            <a:pPr marL="0" lvl="0" indent="0" algn="l" rtl="0">
+            <a:pPr marL="0" lvl="0" indent="0" algn="just" rtl="0">
               <a:lnSpc>
                 <a:spcPct val="100000"/>
               </a:lnSpc>
@@ -19172,21 +18525,28 @@
                 <a:latin typeface="Times New Roman" panose="02020603050405020304" pitchFamily="18" charset="0"/>
                 <a:cs typeface="Times New Roman" panose="02020603050405020304" pitchFamily="18" charset="0"/>
               </a:rPr>
-              <a:t>іграх полягає в зростаючій потребі гравців на </a:t>
+              <a:t>іграх полягає в зростаючій потребі гравців на</a:t>
             </a:r>
             <a:r>
-              <a:rPr lang="uk-UA" sz="2000" dirty="0" err="1">
+              <a:rPr lang="en-US" sz="2000" dirty="0">
                 <a:latin typeface="Times New Roman" panose="02020603050405020304" pitchFamily="18" charset="0"/>
                 <a:cs typeface="Times New Roman" panose="02020603050405020304" pitchFamily="18" charset="0"/>
               </a:rPr>
-              <a:t>реалістични</a:t>
+              <a:t> </a:t>
+            </a:r>
+            <a:r>
+              <a:rPr lang="uk-UA" sz="2000" dirty="0">
+                <a:latin typeface="Times New Roman" panose="02020603050405020304" pitchFamily="18" charset="0"/>
+                <a:cs typeface="Times New Roman" panose="02020603050405020304" pitchFamily="18" charset="0"/>
+              </a:rPr>
+              <a:t>реалістичний</a:t>
             </a:r>
             <a:r>
               <a:rPr lang="ru-RU" sz="2000" dirty="0">
                 <a:latin typeface="Times New Roman" panose="02020603050405020304" pitchFamily="18" charset="0"/>
                 <a:cs typeface="Times New Roman" panose="02020603050405020304" pitchFamily="18" charset="0"/>
               </a:rPr>
-              <a:t>й, </a:t>
+              <a:t>, </a:t>
             </a:r>
             <a:r>
               <a:rPr lang="uk-UA" sz="2000" dirty="0">
@@ -19893,13 +19253,8 @@
             </a:r>
             <a:r>
               <a:rPr lang="uk-UA" sz="2400" dirty="0"/>
-              <a:t>(скорочена</a:t>
+              <a:t>(скорочена)</a:t>
             </a:r>
-            <a:r>
-              <a:rPr lang="uk-UA" sz="3200" dirty="0"/>
-              <a:t>)</a:t>
-            </a:r>
-            <a:endParaRPr lang="uk-UA" dirty="0"/>
           </a:p>
         </p:txBody>
       </p:sp>

</xml_diff>